<commit_message>
Update TD Session files
</commit_message>
<xml_diff>
--- a/PRESENTATIONS/2023-09-tpac/2023-09-14-TD2-Planning-Sebastian.pptx
+++ b/PRESENTATIONS/2023-09-tpac/2023-09-14-TD2-Planning-Sebastian.pptx
@@ -8084,8 +8084,24 @@
               <a:rPr lang="en-US" dirty="0"/>
               <a:t>Propose a mechanism how action status can be quired and be described in the TD</a:t>
             </a:r>
-          </a:p>
-          <a:p>
+            <a:br>
+              <a:rPr lang="en-US" dirty="0"/>
+            </a:br>
+            <a:br>
+              <a:rPr lang="en-US" dirty="0"/>
+            </a:br>
+            <a:r>
+              <a:rPr lang="en-US" dirty="0">
+                <a:sym typeface="Wingdings" pitchFamily="2" charset="2"/>
+              </a:rPr>
+              <a:t> also see presentation from Michael </a:t>
+            </a:r>
+            <a:r>
+              <a:rPr lang="en-US" dirty="0" err="1">
+                <a:sym typeface="Wingdings" pitchFamily="2" charset="2"/>
+              </a:rPr>
+              <a:t>Koster</a:t>
+            </a:r>
             <a:endParaRPr lang="en-US" dirty="0"/>
           </a:p>
         </p:txBody>
@@ -8112,8 +8128,16 @@
           <a:lstStyle/>
           <a:p>
             <a:r>
-              <a:rPr lang="en-US"/>
-              <a:t>W3C Web of Things (WoT) WG/IG</a:t>
+              <a:rPr lang="en-US" dirty="0"/>
+              <a:t>W3C Web of Things (</a:t>
+            </a:r>
+            <a:r>
+              <a:rPr lang="en-US" dirty="0" err="1"/>
+              <a:t>WoT</a:t>
+            </a:r>
+            <a:r>
+              <a:rPr lang="en-US" dirty="0"/>
+              <a:t>) WG/IG</a:t>
             </a:r>
           </a:p>
         </p:txBody>
@@ -8332,7 +8356,7 @@
         <p:spPr/>
         <p:txBody>
           <a:bodyPr>
-            <a:normAutofit lnSpcReduction="10000"/>
+            <a:normAutofit fontScale="92500" lnSpcReduction="10000"/>
           </a:bodyPr>
           <a:lstStyle/>
           <a:p>
@@ -8390,8 +8414,36 @@
           <a:p>
             <a:r>
               <a:rPr lang="en-US" dirty="0"/>
-              <a:t>Bindings, e.g., extend the set of official protocol supports</a:t>
-            </a:r>
+              <a:t>Bindings &amp; Registry, e.g., extend the set of official protocol supports</a:t>
+            </a:r>
+            <a:br>
+              <a:rPr lang="en-US" dirty="0"/>
+            </a:br>
+            <a:r>
+              <a:rPr lang="en-US" dirty="0">
+                <a:sym typeface="Wingdings" pitchFamily="2" charset="2"/>
+              </a:rPr>
+              <a:t> also see presentation from </a:t>
+            </a:r>
+            <a:r>
+              <a:rPr lang="en-US" dirty="0" err="1">
+                <a:sym typeface="Wingdings" pitchFamily="2" charset="2"/>
+              </a:rPr>
+              <a:t>Ege</a:t>
+            </a:r>
+            <a:r>
+              <a:rPr lang="en-US" dirty="0">
+                <a:sym typeface="Wingdings" pitchFamily="2" charset="2"/>
+              </a:rPr>
+              <a:t> </a:t>
+            </a:r>
+            <a:r>
+              <a:rPr lang="en-US" dirty="0" err="1">
+                <a:sym typeface="Wingdings" pitchFamily="2" charset="2"/>
+              </a:rPr>
+              <a:t>Korkan</a:t>
+            </a:r>
+            <a:endParaRPr lang="en-US" dirty="0"/>
           </a:p>
           <a:p>
             <a:endParaRPr lang="en-US" dirty="0"/>

</xml_diff>